<commit_message>
wip: new user login
</commit_message>
<xml_diff>
--- a/app-pallet-rack-costing.pptx
+++ b/app-pallet-rack-costing.pptx
@@ -248,7 +248,7 @@
           <a:p>
             <a:fld id="{318E1502-E61F-4BB6-8EE4-8357EE119714}" type="datetimeFigureOut">
               <a:rPr lang="en-US" smtClean="0"/>
-              <a:t>18/03/2017</a:t>
+              <a:t>19/03/2017</a:t>
             </a:fld>
             <a:endParaRPr lang="en-US"/>
           </a:p>
@@ -418,7 +418,7 @@
           <a:p>
             <a:fld id="{318E1502-E61F-4BB6-8EE4-8357EE119714}" type="datetimeFigureOut">
               <a:rPr lang="en-US" smtClean="0"/>
-              <a:t>18/03/2017</a:t>
+              <a:t>19/03/2017</a:t>
             </a:fld>
             <a:endParaRPr lang="en-US"/>
           </a:p>
@@ -598,7 +598,7 @@
           <a:p>
             <a:fld id="{318E1502-E61F-4BB6-8EE4-8357EE119714}" type="datetimeFigureOut">
               <a:rPr lang="en-US" smtClean="0"/>
-              <a:t>18/03/2017</a:t>
+              <a:t>19/03/2017</a:t>
             </a:fld>
             <a:endParaRPr lang="en-US"/>
           </a:p>
@@ -768,7 +768,7 @@
           <a:p>
             <a:fld id="{318E1502-E61F-4BB6-8EE4-8357EE119714}" type="datetimeFigureOut">
               <a:rPr lang="en-US" smtClean="0"/>
-              <a:t>18/03/2017</a:t>
+              <a:t>19/03/2017</a:t>
             </a:fld>
             <a:endParaRPr lang="en-US"/>
           </a:p>
@@ -1014,7 +1014,7 @@
           <a:p>
             <a:fld id="{318E1502-E61F-4BB6-8EE4-8357EE119714}" type="datetimeFigureOut">
               <a:rPr lang="en-US" smtClean="0"/>
-              <a:t>18/03/2017</a:t>
+              <a:t>19/03/2017</a:t>
             </a:fld>
             <a:endParaRPr lang="en-US"/>
           </a:p>
@@ -1246,7 +1246,7 @@
           <a:p>
             <a:fld id="{318E1502-E61F-4BB6-8EE4-8357EE119714}" type="datetimeFigureOut">
               <a:rPr lang="en-US" smtClean="0"/>
-              <a:t>18/03/2017</a:t>
+              <a:t>19/03/2017</a:t>
             </a:fld>
             <a:endParaRPr lang="en-US"/>
           </a:p>
@@ -1613,7 +1613,7 @@
           <a:p>
             <a:fld id="{318E1502-E61F-4BB6-8EE4-8357EE119714}" type="datetimeFigureOut">
               <a:rPr lang="en-US" smtClean="0"/>
-              <a:t>18/03/2017</a:t>
+              <a:t>19/03/2017</a:t>
             </a:fld>
             <a:endParaRPr lang="en-US"/>
           </a:p>
@@ -1731,7 +1731,7 @@
           <a:p>
             <a:fld id="{318E1502-E61F-4BB6-8EE4-8357EE119714}" type="datetimeFigureOut">
               <a:rPr lang="en-US" smtClean="0"/>
-              <a:t>18/03/2017</a:t>
+              <a:t>19/03/2017</a:t>
             </a:fld>
             <a:endParaRPr lang="en-US"/>
           </a:p>
@@ -1826,7 +1826,7 @@
           <a:p>
             <a:fld id="{318E1502-E61F-4BB6-8EE4-8357EE119714}" type="datetimeFigureOut">
               <a:rPr lang="en-US" smtClean="0"/>
-              <a:t>18/03/2017</a:t>
+              <a:t>19/03/2017</a:t>
             </a:fld>
             <a:endParaRPr lang="en-US"/>
           </a:p>
@@ -2103,7 +2103,7 @@
           <a:p>
             <a:fld id="{318E1502-E61F-4BB6-8EE4-8357EE119714}" type="datetimeFigureOut">
               <a:rPr lang="en-US" smtClean="0"/>
-              <a:t>18/03/2017</a:t>
+              <a:t>19/03/2017</a:t>
             </a:fld>
             <a:endParaRPr lang="en-US"/>
           </a:p>
@@ -2356,7 +2356,7 @@
           <a:p>
             <a:fld id="{318E1502-E61F-4BB6-8EE4-8357EE119714}" type="datetimeFigureOut">
               <a:rPr lang="en-US" smtClean="0"/>
-              <a:t>18/03/2017</a:t>
+              <a:t>19/03/2017</a:t>
             </a:fld>
             <a:endParaRPr lang="en-US"/>
           </a:p>
@@ -2569,7 +2569,7 @@
           <a:p>
             <a:fld id="{318E1502-E61F-4BB6-8EE4-8357EE119714}" type="datetimeFigureOut">
               <a:rPr lang="en-US" smtClean="0"/>
-              <a:t>18/03/2017</a:t>
+              <a:t>19/03/2017</a:t>
             </a:fld>
             <a:endParaRPr lang="en-US"/>
           </a:p>
@@ -3019,7 +3019,6 @@
               <a:rPr lang="en-US" sz="3600" dirty="0" smtClean="0"/>
               <a:t>User Name: [Text Input]</a:t>
             </a:r>
-            <a:endParaRPr lang="en-US" sz="3600" dirty="0" smtClean="0"/>
           </a:p>
           <a:p>
             <a:pPr marL="3657600" lvl="8" indent="0">
@@ -3085,7 +3084,7 @@
             <a:pPr algn="ctr"/>
             <a:r>
               <a:rPr lang="en-US" b="1" dirty="0" smtClean="0"/>
-              <a:t>Login and Create New Quote</a:t>
+              <a:t>Login</a:t>
             </a:r>
             <a:endParaRPr lang="en-US" b="1" dirty="0"/>
           </a:p>
@@ -3099,7 +3098,7 @@
         </p:nvSpPr>
         <p:spPr>
           <a:xfrm>
-            <a:off x="5188974" y="4637677"/>
+            <a:off x="5188974" y="4838405"/>
             <a:ext cx="1814052" cy="501446"/>
           </a:xfrm>
           <a:prstGeom prst="roundRect">
@@ -3755,6 +3754,46 @@
       </p:grpSpPr>
       <p:sp>
         <p:nvSpPr>
+          <p:cNvPr id="2" name="Rectangle 1"/>
+          <p:cNvSpPr/>
+          <p:nvPr/>
+        </p:nvSpPr>
+        <p:spPr>
+          <a:xfrm>
+            <a:off x="1663908" y="1690688"/>
+            <a:ext cx="9114020" cy="4215437"/>
+          </a:xfrm>
+          <a:prstGeom prst="rect">
+            <a:avLst/>
+          </a:prstGeom>
+        </p:spPr>
+        <p:style>
+          <a:lnRef idx="2">
+            <a:schemeClr val="accent1">
+              <a:shade val="50000"/>
+            </a:schemeClr>
+          </a:lnRef>
+          <a:fillRef idx="1">
+            <a:schemeClr val="accent1"/>
+          </a:fillRef>
+          <a:effectRef idx="0">
+            <a:schemeClr val="accent1"/>
+          </a:effectRef>
+          <a:fontRef idx="minor">
+            <a:schemeClr val="lt1"/>
+          </a:fontRef>
+        </p:style>
+        <p:txBody>
+          <a:bodyPr rtlCol="0" anchor="ctr"/>
+          <a:lstStyle/>
+          <a:p>
+            <a:pPr algn="ctr"/>
+            <a:endParaRPr lang="en-US"/>
+          </a:p>
+        </p:txBody>
+      </p:sp>
+      <p:sp>
+        <p:nvSpPr>
           <p:cNvPr id="5" name="Title 4"/>
           <p:cNvSpPr>
             <a:spLocks noGrp="1"/>
@@ -3770,37 +3809,37 @@
           <a:p>
             <a:r>
               <a:rPr lang="en-US" dirty="0" smtClean="0"/>
-              <a:t>New </a:t>
-            </a:r>
+              <a:t>New Quote – POP UP</a:t>
+            </a:r>
+            <a:endParaRPr lang="en-US" dirty="0"/>
+          </a:p>
+        </p:txBody>
+      </p:sp>
+      <p:sp>
+        <p:nvSpPr>
+          <p:cNvPr id="6" name="Content Placeholder 5"/>
+          <p:cNvSpPr>
+            <a:spLocks noGrp="1"/>
+          </p:cNvSpPr>
+          <p:nvPr>
+            <p:ph idx="1"/>
+          </p:nvPr>
+        </p:nvSpPr>
+        <p:spPr/>
+        <p:txBody>
+          <a:bodyPr/>
+          <a:lstStyle/>
+          <a:p>
+            <a:pPr marL="0" indent="0" algn="ctr">
+              <a:buNone/>
+            </a:pPr>
             <a:r>
               <a:rPr lang="en-US" dirty="0" smtClean="0"/>
-              <a:t>Quote – POP UP</a:t>
-            </a:r>
-            <a:endParaRPr lang="en-US" dirty="0"/>
-          </a:p>
-        </p:txBody>
-      </p:sp>
-      <p:sp>
-        <p:nvSpPr>
-          <p:cNvPr id="6" name="Content Placeholder 5"/>
-          <p:cNvSpPr>
-            <a:spLocks noGrp="1"/>
-          </p:cNvSpPr>
-          <p:nvPr>
-            <p:ph idx="1"/>
-          </p:nvPr>
-        </p:nvSpPr>
-        <p:spPr/>
-        <p:txBody>
-          <a:bodyPr/>
-          <a:lstStyle/>
-          <a:p>
-            <a:pPr marL="0" indent="0" algn="ctr">
-              <a:buNone/>
-            </a:pPr>
+              <a:t>Company: </a:t>
+            </a:r>
             <a:r>
               <a:rPr lang="en-US" dirty="0" smtClean="0"/>
-              <a:t>Company Name: [TEXT AREA]</a:t>
+              <a:t>[TEXT AREA]</a:t>
             </a:r>
           </a:p>
           <a:p>
@@ -3814,8 +3853,12 @@
               <a:buNone/>
             </a:pPr>
             <a:r>
+              <a:rPr lang="en-US" smtClean="0"/>
+              <a:t>Project: </a:t>
+            </a:r>
+            <a:r>
               <a:rPr lang="en-US" dirty="0"/>
-              <a:t>Project Name and Description: [12 Doors for Site Branch</a:t>
+              <a:t>[12 Doors for Site Branch</a:t>
             </a:r>
             <a:r>
               <a:rPr lang="en-US" dirty="0" smtClean="0"/>
@@ -4229,7 +4272,6 @@
               <a:rPr lang="en-US" b="1" dirty="0"/>
               <a:t>Generate Quote</a:t>
             </a:r>
-            <a:endParaRPr lang="en-US" b="1" dirty="0"/>
           </a:p>
         </p:txBody>
       </p:sp>
@@ -4335,11 +4377,7 @@
           <a:p>
             <a:r>
               <a:rPr lang="en-US" dirty="0" smtClean="0"/>
-              <a:t>1 - Client-Project	 </a:t>
-            </a:r>
-            <a:r>
-              <a:rPr lang="en-US" dirty="0" smtClean="0"/>
-              <a:t>		[Edit]</a:t>
+              <a:t>1 - Client-Project	 		[Edit]</a:t>
             </a:r>
             <a:r>
               <a:rPr lang="en-US" dirty="0"/>
@@ -4353,11 +4391,7 @@
           <a:p>
             <a:r>
               <a:rPr lang="en-US" dirty="0" smtClean="0"/>
-              <a:t>2 - Client-Project</a:t>
-            </a:r>
-            <a:r>
-              <a:rPr lang="en-US" dirty="0" smtClean="0"/>
-              <a:t>			[Edit]		[Delete]	[Duplicate]</a:t>
+              <a:t>2 - Client-Project			[Edit]		[Delete]	[Duplicate]</a:t>
             </a:r>
           </a:p>
           <a:p>
@@ -4365,7 +4399,6 @@
               <a:rPr lang="en-US" dirty="0" smtClean="0"/>
               <a:t>…</a:t>
             </a:r>
-            <a:endParaRPr lang="en-US" dirty="0" smtClean="0"/>
           </a:p>
         </p:txBody>
       </p:sp>

</xml_diff>

<commit_message>
wip: new pallet rack costing page
</commit_message>
<xml_diff>
--- a/app-pallet-rack-costing.pptx
+++ b/app-pallet-rack-costing.pptx
@@ -248,7 +248,7 @@
           <a:p>
             <a:fld id="{318E1502-E61F-4BB6-8EE4-8357EE119714}" type="datetimeFigureOut">
               <a:rPr lang="en-US" smtClean="0"/>
-              <a:t>19/03/2017</a:t>
+              <a:t>3/21/2017</a:t>
             </a:fld>
             <a:endParaRPr lang="en-US"/>
           </a:p>
@@ -418,7 +418,7 @@
           <a:p>
             <a:fld id="{318E1502-E61F-4BB6-8EE4-8357EE119714}" type="datetimeFigureOut">
               <a:rPr lang="en-US" smtClean="0"/>
-              <a:t>19/03/2017</a:t>
+              <a:t>3/21/2017</a:t>
             </a:fld>
             <a:endParaRPr lang="en-US"/>
           </a:p>
@@ -598,7 +598,7 @@
           <a:p>
             <a:fld id="{318E1502-E61F-4BB6-8EE4-8357EE119714}" type="datetimeFigureOut">
               <a:rPr lang="en-US" smtClean="0"/>
-              <a:t>19/03/2017</a:t>
+              <a:t>3/21/2017</a:t>
             </a:fld>
             <a:endParaRPr lang="en-US"/>
           </a:p>
@@ -768,7 +768,7 @@
           <a:p>
             <a:fld id="{318E1502-E61F-4BB6-8EE4-8357EE119714}" type="datetimeFigureOut">
               <a:rPr lang="en-US" smtClean="0"/>
-              <a:t>19/03/2017</a:t>
+              <a:t>3/21/2017</a:t>
             </a:fld>
             <a:endParaRPr lang="en-US"/>
           </a:p>
@@ -1014,7 +1014,7 @@
           <a:p>
             <a:fld id="{318E1502-E61F-4BB6-8EE4-8357EE119714}" type="datetimeFigureOut">
               <a:rPr lang="en-US" smtClean="0"/>
-              <a:t>19/03/2017</a:t>
+              <a:t>3/21/2017</a:t>
             </a:fld>
             <a:endParaRPr lang="en-US"/>
           </a:p>
@@ -1246,7 +1246,7 @@
           <a:p>
             <a:fld id="{318E1502-E61F-4BB6-8EE4-8357EE119714}" type="datetimeFigureOut">
               <a:rPr lang="en-US" smtClean="0"/>
-              <a:t>19/03/2017</a:t>
+              <a:t>3/21/2017</a:t>
             </a:fld>
             <a:endParaRPr lang="en-US"/>
           </a:p>
@@ -1613,7 +1613,7 @@
           <a:p>
             <a:fld id="{318E1502-E61F-4BB6-8EE4-8357EE119714}" type="datetimeFigureOut">
               <a:rPr lang="en-US" smtClean="0"/>
-              <a:t>19/03/2017</a:t>
+              <a:t>3/21/2017</a:t>
             </a:fld>
             <a:endParaRPr lang="en-US"/>
           </a:p>
@@ -1731,7 +1731,7 @@
           <a:p>
             <a:fld id="{318E1502-E61F-4BB6-8EE4-8357EE119714}" type="datetimeFigureOut">
               <a:rPr lang="en-US" smtClean="0"/>
-              <a:t>19/03/2017</a:t>
+              <a:t>3/21/2017</a:t>
             </a:fld>
             <a:endParaRPr lang="en-US"/>
           </a:p>
@@ -1826,7 +1826,7 @@
           <a:p>
             <a:fld id="{318E1502-E61F-4BB6-8EE4-8357EE119714}" type="datetimeFigureOut">
               <a:rPr lang="en-US" smtClean="0"/>
-              <a:t>19/03/2017</a:t>
+              <a:t>3/21/2017</a:t>
             </a:fld>
             <a:endParaRPr lang="en-US"/>
           </a:p>
@@ -2103,7 +2103,7 @@
           <a:p>
             <a:fld id="{318E1502-E61F-4BB6-8EE4-8357EE119714}" type="datetimeFigureOut">
               <a:rPr lang="en-US" smtClean="0"/>
-              <a:t>19/03/2017</a:t>
+              <a:t>3/21/2017</a:t>
             </a:fld>
             <a:endParaRPr lang="en-US"/>
           </a:p>
@@ -2356,7 +2356,7 @@
           <a:p>
             <a:fld id="{318E1502-E61F-4BB6-8EE4-8357EE119714}" type="datetimeFigureOut">
               <a:rPr lang="en-US" smtClean="0"/>
-              <a:t>19/03/2017</a:t>
+              <a:t>3/21/2017</a:t>
             </a:fld>
             <a:endParaRPr lang="en-US"/>
           </a:p>
@@ -2569,7 +2569,7 @@
           <a:p>
             <a:fld id="{318E1502-E61F-4BB6-8EE4-8357EE119714}" type="datetimeFigureOut">
               <a:rPr lang="en-US" smtClean="0"/>
-              <a:t>19/03/2017</a:t>
+              <a:t>3/21/2017</a:t>
             </a:fld>
             <a:endParaRPr lang="en-US"/>
           </a:p>
@@ -3835,11 +3835,7 @@
             </a:pPr>
             <a:r>
               <a:rPr lang="en-US" dirty="0" smtClean="0"/>
-              <a:t>Company: </a:t>
-            </a:r>
-            <a:r>
-              <a:rPr lang="en-US" dirty="0" smtClean="0"/>
-              <a:t>[TEXT AREA]</a:t>
+              <a:t>Company: [TEXT AREA]</a:t>
             </a:r>
           </a:p>
           <a:p>

</xml_diff>

<commit_message>
wip: new pallet racks project, added wells
</commit_message>
<xml_diff>
--- a/app-pallet-rack-costing.pptx
+++ b/app-pallet-rack-costing.pptx
@@ -248,7 +248,7 @@
           <a:p>
             <a:fld id="{318E1502-E61F-4BB6-8EE4-8357EE119714}" type="datetimeFigureOut">
               <a:rPr lang="en-US" smtClean="0"/>
-              <a:t>3/21/2017</a:t>
+              <a:t>23/03/2017</a:t>
             </a:fld>
             <a:endParaRPr lang="en-US"/>
           </a:p>
@@ -418,7 +418,7 @@
           <a:p>
             <a:fld id="{318E1502-E61F-4BB6-8EE4-8357EE119714}" type="datetimeFigureOut">
               <a:rPr lang="en-US" smtClean="0"/>
-              <a:t>3/21/2017</a:t>
+              <a:t>23/03/2017</a:t>
             </a:fld>
             <a:endParaRPr lang="en-US"/>
           </a:p>
@@ -598,7 +598,7 @@
           <a:p>
             <a:fld id="{318E1502-E61F-4BB6-8EE4-8357EE119714}" type="datetimeFigureOut">
               <a:rPr lang="en-US" smtClean="0"/>
-              <a:t>3/21/2017</a:t>
+              <a:t>23/03/2017</a:t>
             </a:fld>
             <a:endParaRPr lang="en-US"/>
           </a:p>
@@ -768,7 +768,7 @@
           <a:p>
             <a:fld id="{318E1502-E61F-4BB6-8EE4-8357EE119714}" type="datetimeFigureOut">
               <a:rPr lang="en-US" smtClean="0"/>
-              <a:t>3/21/2017</a:t>
+              <a:t>23/03/2017</a:t>
             </a:fld>
             <a:endParaRPr lang="en-US"/>
           </a:p>
@@ -1014,7 +1014,7 @@
           <a:p>
             <a:fld id="{318E1502-E61F-4BB6-8EE4-8357EE119714}" type="datetimeFigureOut">
               <a:rPr lang="en-US" smtClean="0"/>
-              <a:t>3/21/2017</a:t>
+              <a:t>23/03/2017</a:t>
             </a:fld>
             <a:endParaRPr lang="en-US"/>
           </a:p>
@@ -1246,7 +1246,7 @@
           <a:p>
             <a:fld id="{318E1502-E61F-4BB6-8EE4-8357EE119714}" type="datetimeFigureOut">
               <a:rPr lang="en-US" smtClean="0"/>
-              <a:t>3/21/2017</a:t>
+              <a:t>23/03/2017</a:t>
             </a:fld>
             <a:endParaRPr lang="en-US"/>
           </a:p>
@@ -1613,7 +1613,7 @@
           <a:p>
             <a:fld id="{318E1502-E61F-4BB6-8EE4-8357EE119714}" type="datetimeFigureOut">
               <a:rPr lang="en-US" smtClean="0"/>
-              <a:t>3/21/2017</a:t>
+              <a:t>23/03/2017</a:t>
             </a:fld>
             <a:endParaRPr lang="en-US"/>
           </a:p>
@@ -1731,7 +1731,7 @@
           <a:p>
             <a:fld id="{318E1502-E61F-4BB6-8EE4-8357EE119714}" type="datetimeFigureOut">
               <a:rPr lang="en-US" smtClean="0"/>
-              <a:t>3/21/2017</a:t>
+              <a:t>23/03/2017</a:t>
             </a:fld>
             <a:endParaRPr lang="en-US"/>
           </a:p>
@@ -1826,7 +1826,7 @@
           <a:p>
             <a:fld id="{318E1502-E61F-4BB6-8EE4-8357EE119714}" type="datetimeFigureOut">
               <a:rPr lang="en-US" smtClean="0"/>
-              <a:t>3/21/2017</a:t>
+              <a:t>23/03/2017</a:t>
             </a:fld>
             <a:endParaRPr lang="en-US"/>
           </a:p>
@@ -2103,7 +2103,7 @@
           <a:p>
             <a:fld id="{318E1502-E61F-4BB6-8EE4-8357EE119714}" type="datetimeFigureOut">
               <a:rPr lang="en-US" smtClean="0"/>
-              <a:t>3/21/2017</a:t>
+              <a:t>23/03/2017</a:t>
             </a:fld>
             <a:endParaRPr lang="en-US"/>
           </a:p>
@@ -2356,7 +2356,7 @@
           <a:p>
             <a:fld id="{318E1502-E61F-4BB6-8EE4-8357EE119714}" type="datetimeFigureOut">
               <a:rPr lang="en-US" smtClean="0"/>
-              <a:t>3/21/2017</a:t>
+              <a:t>23/03/2017</a:t>
             </a:fld>
             <a:endParaRPr lang="en-US"/>
           </a:p>
@@ -2569,7 +2569,7 @@
           <a:p>
             <a:fld id="{318E1502-E61F-4BB6-8EE4-8357EE119714}" type="datetimeFigureOut">
               <a:rPr lang="en-US" smtClean="0"/>
-              <a:t>3/21/2017</a:t>
+              <a:t>23/03/2017</a:t>
             </a:fld>
             <a:endParaRPr lang="en-US"/>
           </a:p>
@@ -4023,127 +4023,6 @@
       </p:sp>
       <p:sp>
         <p:nvSpPr>
-          <p:cNvPr id="3" name="Content Placeholder 2"/>
-          <p:cNvSpPr>
-            <a:spLocks noGrp="1"/>
-          </p:cNvSpPr>
-          <p:nvPr>
-            <p:ph sz="half" idx="2"/>
-          </p:nvPr>
-        </p:nvSpPr>
-        <p:spPr/>
-        <p:txBody>
-          <a:bodyPr>
-            <a:normAutofit fontScale="77500" lnSpcReduction="20000"/>
-          </a:bodyPr>
-          <a:lstStyle/>
-          <a:p>
-            <a:r>
-              <a:rPr lang="en-US" sz="2400" dirty="0" smtClean="0"/>
-              <a:t>Rack Quantity: </a:t>
-            </a:r>
-            <a:r>
-              <a:rPr lang="en-US" sz="2400" dirty="0"/>
-              <a:t>	[Text Input]</a:t>
-            </a:r>
-          </a:p>
-          <a:p>
-            <a:r>
-              <a:rPr lang="en-US" sz="2400" dirty="0" smtClean="0"/>
-              <a:t>No of Rows: </a:t>
-            </a:r>
-            <a:r>
-              <a:rPr lang="en-US" sz="2400" dirty="0"/>
-              <a:t>		[Text Input]</a:t>
-            </a:r>
-            <a:endParaRPr lang="en-US" sz="2400" dirty="0" smtClean="0"/>
-          </a:p>
-          <a:p>
-            <a:endParaRPr lang="en-US" sz="2400" dirty="0" smtClean="0"/>
-          </a:p>
-          <a:p>
-            <a:r>
-              <a:rPr lang="en-US" sz="2400" dirty="0" smtClean="0"/>
-              <a:t>Frame Height: 	[</a:t>
-            </a:r>
-            <a:r>
-              <a:rPr lang="en-US" sz="2400" dirty="0"/>
-              <a:t>Text Input</a:t>
-            </a:r>
-            <a:r>
-              <a:rPr lang="en-US" sz="2400" dirty="0" smtClean="0"/>
-              <a:t>]</a:t>
-            </a:r>
-          </a:p>
-          <a:p>
-            <a:endParaRPr lang="en-US" sz="2400" dirty="0" smtClean="0"/>
-          </a:p>
-          <a:p>
-            <a:r>
-              <a:rPr lang="en-US" sz="2400" dirty="0" smtClean="0"/>
-              <a:t>Rack/Bay Length: 	[</a:t>
-            </a:r>
-            <a:r>
-              <a:rPr lang="en-US" sz="2400" dirty="0"/>
-              <a:t>Text Input</a:t>
-            </a:r>
-            <a:r>
-              <a:rPr lang="en-US" sz="2400" dirty="0" smtClean="0"/>
-              <a:t>]</a:t>
-            </a:r>
-          </a:p>
-          <a:p>
-            <a:r>
-              <a:rPr lang="en-US" sz="2400" dirty="0" smtClean="0"/>
-              <a:t>Rack/Bay Depth: 	[</a:t>
-            </a:r>
-            <a:r>
-              <a:rPr lang="en-US" sz="2400" dirty="0"/>
-              <a:t>Text Input</a:t>
-            </a:r>
-            <a:r>
-              <a:rPr lang="en-US" sz="2400" dirty="0" smtClean="0"/>
-              <a:t>]</a:t>
-            </a:r>
-          </a:p>
-          <a:p>
-            <a:endParaRPr lang="en-US" sz="2400" dirty="0"/>
-          </a:p>
-          <a:p>
-            <a:r>
-              <a:rPr lang="en-US" sz="2400" dirty="0" smtClean="0"/>
-              <a:t>Wight Capacity per Level: </a:t>
-            </a:r>
-          </a:p>
-          <a:p>
-            <a:r>
-              <a:rPr lang="en-US" sz="2400" dirty="0" smtClean="0"/>
-              <a:t>Actual: 		[</a:t>
-            </a:r>
-            <a:r>
-              <a:rPr lang="en-US" sz="2400" dirty="0"/>
-              <a:t>Text Input]</a:t>
-            </a:r>
-            <a:endParaRPr lang="en-US" sz="2400" dirty="0" smtClean="0"/>
-          </a:p>
-          <a:p>
-            <a:r>
-              <a:rPr lang="en-US" sz="2400" dirty="0" smtClean="0"/>
-              <a:t>Demanded: 	</a:t>
-            </a:r>
-            <a:r>
-              <a:rPr lang="en-US" sz="2400" dirty="0"/>
-              <a:t>	[Text Input]</a:t>
-            </a:r>
-            <a:endParaRPr lang="en-US" sz="1800" dirty="0"/>
-          </a:p>
-          <a:p>
-            <a:endParaRPr lang="en-US" sz="1800" dirty="0"/>
-          </a:p>
-        </p:txBody>
-      </p:sp>
-      <p:sp>
-        <p:nvSpPr>
           <p:cNvPr id="7" name="Content Placeholder 6"/>
           <p:cNvSpPr>
             <a:spLocks noGrp="1"/>
@@ -4273,33 +4152,224 @@
       </p:sp>
       <p:sp>
         <p:nvSpPr>
-          <p:cNvPr id="14" name="Text Placeholder 4"/>
-          <p:cNvSpPr>
-            <a:spLocks noGrp="1"/>
-          </p:cNvSpPr>
-          <p:nvPr>
-            <p:ph type="body" idx="1"/>
-          </p:nvPr>
+          <p:cNvPr id="8" name="Rounded Rectangle 7"/>
+          <p:cNvSpPr/>
+          <p:nvPr/>
         </p:nvSpPr>
         <p:spPr>
           <a:xfrm>
-            <a:off x="6097588" y="1681163"/>
-            <a:ext cx="5157787" cy="823912"/>
+            <a:off x="641445" y="2620369"/>
+            <a:ext cx="4285397" cy="1665028"/>
           </a:xfrm>
+          <a:prstGeom prst="roundRect">
+            <a:avLst/>
+          </a:prstGeom>
         </p:spPr>
-        <p:txBody>
-          <a:bodyPr/>
-          <a:lstStyle/>
+        <p:style>
+          <a:lnRef idx="2">
+            <a:schemeClr val="accent1">
+              <a:shade val="50000"/>
+            </a:schemeClr>
+          </a:lnRef>
+          <a:fillRef idx="1">
+            <a:schemeClr val="accent1"/>
+          </a:fillRef>
+          <a:effectRef idx="0">
+            <a:schemeClr val="accent1"/>
+          </a:effectRef>
+          <a:fontRef idx="minor">
+            <a:schemeClr val="lt1"/>
+          </a:fontRef>
+        </p:style>
+        <p:txBody>
+          <a:bodyPr rtlCol="0" anchor="ctr"/>
+          <a:lstStyle/>
+          <a:p>
+            <a:pPr algn="ctr"/>
+            <a:r>
+              <a:rPr lang="en-US" b="1" u="sng" dirty="0" smtClean="0"/>
+              <a:t>Frame</a:t>
+            </a:r>
+          </a:p>
+          <a:p>
+            <a:r>
+              <a:rPr lang="en-US" dirty="0" smtClean="0"/>
+              <a:t>Frame Type	</a:t>
+            </a:r>
+          </a:p>
+          <a:p>
+            <a:endParaRPr lang="en-US" dirty="0"/>
+          </a:p>
+          <a:p>
+            <a:r>
+              <a:rPr lang="en-US" dirty="0" smtClean="0"/>
+              <a:t>Frame Height</a:t>
+            </a:r>
+          </a:p>
+          <a:p>
+            <a:endParaRPr lang="en-US" dirty="0"/>
+          </a:p>
+          <a:p>
+            <a:r>
+              <a:rPr lang="en-US" dirty="0" smtClean="0"/>
+              <a:t>Frame </a:t>
+            </a:r>
+            <a:r>
+              <a:rPr lang="en-US" dirty="0" err="1" smtClean="0"/>
+              <a:t>Qty</a:t>
+            </a:r>
+            <a:r>
+              <a:rPr lang="en-US" dirty="0" smtClean="0"/>
+              <a:t>: </a:t>
+            </a:r>
+          </a:p>
+        </p:txBody>
+      </p:sp>
+      <p:sp>
+        <p:nvSpPr>
+          <p:cNvPr id="11" name="Rounded Rectangle 10"/>
+          <p:cNvSpPr/>
+          <p:nvPr/>
+        </p:nvSpPr>
+        <p:spPr>
+          <a:xfrm>
+            <a:off x="641444" y="4535508"/>
+            <a:ext cx="4285397" cy="2322491"/>
+          </a:xfrm>
+          <a:prstGeom prst="roundRect">
+            <a:avLst/>
+          </a:prstGeom>
+        </p:spPr>
+        <p:style>
+          <a:lnRef idx="2">
+            <a:schemeClr val="accent1">
+              <a:shade val="50000"/>
+            </a:schemeClr>
+          </a:lnRef>
+          <a:fillRef idx="1">
+            <a:schemeClr val="accent1"/>
+          </a:fillRef>
+          <a:effectRef idx="0">
+            <a:schemeClr val="accent1"/>
+          </a:effectRef>
+          <a:fontRef idx="minor">
+            <a:schemeClr val="lt1"/>
+          </a:fontRef>
+        </p:style>
+        <p:txBody>
+          <a:bodyPr rtlCol="0" anchor="ctr"/>
+          <a:lstStyle/>
+          <a:p>
+            <a:pPr algn="ctr"/>
+            <a:r>
+              <a:rPr lang="en-US" b="1" u="sng" dirty="0" smtClean="0"/>
+              <a:t>Bays</a:t>
+            </a:r>
+          </a:p>
+          <a:p>
+            <a:r>
+              <a:rPr lang="en-US" dirty="0" smtClean="0"/>
+              <a:t>Bay Type: </a:t>
+            </a:r>
+          </a:p>
+          <a:p>
+            <a:endParaRPr lang="en-US" dirty="0"/>
+          </a:p>
+          <a:p>
+            <a:r>
+              <a:rPr lang="en-US" dirty="0" smtClean="0"/>
+              <a:t>Length: </a:t>
+            </a:r>
+          </a:p>
+          <a:p>
+            <a:endParaRPr lang="en-US" dirty="0"/>
+          </a:p>
+          <a:p>
+            <a:r>
+              <a:rPr lang="en-US" dirty="0" smtClean="0"/>
+              <a:t>Number of Levels:</a:t>
+            </a:r>
+          </a:p>
+          <a:p>
+            <a:endParaRPr lang="en-US" dirty="0"/>
+          </a:p>
+          <a:p>
+            <a:r>
+              <a:rPr lang="en-US" dirty="0" smtClean="0"/>
+              <a:t>Weight Capacity per level:  </a:t>
+            </a:r>
+          </a:p>
+        </p:txBody>
+      </p:sp>
+      <p:sp>
+        <p:nvSpPr>
+          <p:cNvPr id="10" name="Rounded Rectangle 9"/>
+          <p:cNvSpPr/>
+          <p:nvPr/>
+        </p:nvSpPr>
+        <p:spPr>
+          <a:xfrm>
+            <a:off x="6172200" y="1351128"/>
+            <a:ext cx="5087203" cy="982639"/>
+          </a:xfrm>
+          <a:prstGeom prst="roundRect">
+            <a:avLst/>
+          </a:prstGeom>
+        </p:spPr>
+        <p:style>
+          <a:lnRef idx="2">
+            <a:schemeClr val="accent1">
+              <a:shade val="50000"/>
+            </a:schemeClr>
+          </a:lnRef>
+          <a:fillRef idx="1">
+            <a:schemeClr val="accent1"/>
+          </a:fillRef>
+          <a:effectRef idx="0">
+            <a:schemeClr val="accent1"/>
+          </a:effectRef>
+          <a:fontRef idx="minor">
+            <a:schemeClr val="lt1"/>
+          </a:fontRef>
+        </p:style>
+        <p:txBody>
+          <a:bodyPr rtlCol="0" anchor="ctr"/>
+          <a:lstStyle/>
+          <a:p>
+            <a:pPr algn="ctr"/>
+            <a:r>
+              <a:rPr lang="en-US" b="1" u="sng" dirty="0" smtClean="0"/>
+              <a:t>COSTING</a:t>
+            </a:r>
+          </a:p>
           <a:p>
             <a:pPr marL="342900" indent="-342900">
               <a:buFont typeface="Arial" panose="020B0604020202020204" pitchFamily="34" charset="0"/>
               <a:buChar char="•"/>
             </a:pPr>
             <a:r>
-              <a:rPr lang="en-US" b="0" dirty="0" smtClean="0"/>
-              <a:t>Project Rate: [TEXT AREA]</a:t>
-            </a:r>
-            <a:endParaRPr lang="en-US" b="0" dirty="0"/>
+              <a:rPr lang="en-US" dirty="0" smtClean="0"/>
+              <a:t>Cost</a:t>
+            </a:r>
+            <a:r>
+              <a:rPr lang="en-US" dirty="0"/>
+              <a:t>: [TEXT AREA]</a:t>
+            </a:r>
+          </a:p>
+          <a:p>
+            <a:pPr marL="342900" indent="-342900">
+              <a:buFont typeface="Arial" panose="020B0604020202020204" pitchFamily="34" charset="0"/>
+              <a:buChar char="•"/>
+            </a:pPr>
+            <a:r>
+              <a:rPr lang="en-US" dirty="0"/>
+              <a:t>Rate: [TEXT AREA</a:t>
+            </a:r>
+            <a:r>
+              <a:rPr lang="en-US" dirty="0" smtClean="0"/>
+              <a:t>]</a:t>
+            </a:r>
+            <a:endParaRPr lang="en-US" dirty="0"/>
           </a:p>
         </p:txBody>
       </p:sp>

</xml_diff>

<commit_message>
wip: pallet rack form
</commit_message>
<xml_diff>
--- a/app-pallet-rack-costing.pptx
+++ b/app-pallet-rack-costing.pptx
@@ -248,7 +248,7 @@
           <a:p>
             <a:fld id="{318E1502-E61F-4BB6-8EE4-8357EE119714}" type="datetimeFigureOut">
               <a:rPr lang="en-US" smtClean="0"/>
-              <a:t>23/03/2017</a:t>
+              <a:t>3/30/2017</a:t>
             </a:fld>
             <a:endParaRPr lang="en-US"/>
           </a:p>
@@ -418,7 +418,7 @@
           <a:p>
             <a:fld id="{318E1502-E61F-4BB6-8EE4-8357EE119714}" type="datetimeFigureOut">
               <a:rPr lang="en-US" smtClean="0"/>
-              <a:t>23/03/2017</a:t>
+              <a:t>3/30/2017</a:t>
             </a:fld>
             <a:endParaRPr lang="en-US"/>
           </a:p>
@@ -598,7 +598,7 @@
           <a:p>
             <a:fld id="{318E1502-E61F-4BB6-8EE4-8357EE119714}" type="datetimeFigureOut">
               <a:rPr lang="en-US" smtClean="0"/>
-              <a:t>23/03/2017</a:t>
+              <a:t>3/30/2017</a:t>
             </a:fld>
             <a:endParaRPr lang="en-US"/>
           </a:p>
@@ -768,7 +768,7 @@
           <a:p>
             <a:fld id="{318E1502-E61F-4BB6-8EE4-8357EE119714}" type="datetimeFigureOut">
               <a:rPr lang="en-US" smtClean="0"/>
-              <a:t>23/03/2017</a:t>
+              <a:t>3/30/2017</a:t>
             </a:fld>
             <a:endParaRPr lang="en-US"/>
           </a:p>
@@ -1014,7 +1014,7 @@
           <a:p>
             <a:fld id="{318E1502-E61F-4BB6-8EE4-8357EE119714}" type="datetimeFigureOut">
               <a:rPr lang="en-US" smtClean="0"/>
-              <a:t>23/03/2017</a:t>
+              <a:t>3/30/2017</a:t>
             </a:fld>
             <a:endParaRPr lang="en-US"/>
           </a:p>
@@ -1246,7 +1246,7 @@
           <a:p>
             <a:fld id="{318E1502-E61F-4BB6-8EE4-8357EE119714}" type="datetimeFigureOut">
               <a:rPr lang="en-US" smtClean="0"/>
-              <a:t>23/03/2017</a:t>
+              <a:t>3/30/2017</a:t>
             </a:fld>
             <a:endParaRPr lang="en-US"/>
           </a:p>
@@ -1613,7 +1613,7 @@
           <a:p>
             <a:fld id="{318E1502-E61F-4BB6-8EE4-8357EE119714}" type="datetimeFigureOut">
               <a:rPr lang="en-US" smtClean="0"/>
-              <a:t>23/03/2017</a:t>
+              <a:t>3/30/2017</a:t>
             </a:fld>
             <a:endParaRPr lang="en-US"/>
           </a:p>
@@ -1731,7 +1731,7 @@
           <a:p>
             <a:fld id="{318E1502-E61F-4BB6-8EE4-8357EE119714}" type="datetimeFigureOut">
               <a:rPr lang="en-US" smtClean="0"/>
-              <a:t>23/03/2017</a:t>
+              <a:t>3/30/2017</a:t>
             </a:fld>
             <a:endParaRPr lang="en-US"/>
           </a:p>
@@ -1826,7 +1826,7 @@
           <a:p>
             <a:fld id="{318E1502-E61F-4BB6-8EE4-8357EE119714}" type="datetimeFigureOut">
               <a:rPr lang="en-US" smtClean="0"/>
-              <a:t>23/03/2017</a:t>
+              <a:t>3/30/2017</a:t>
             </a:fld>
             <a:endParaRPr lang="en-US"/>
           </a:p>
@@ -2103,7 +2103,7 @@
           <a:p>
             <a:fld id="{318E1502-E61F-4BB6-8EE4-8357EE119714}" type="datetimeFigureOut">
               <a:rPr lang="en-US" smtClean="0"/>
-              <a:t>23/03/2017</a:t>
+              <a:t>3/30/2017</a:t>
             </a:fld>
             <a:endParaRPr lang="en-US"/>
           </a:p>
@@ -2356,7 +2356,7 @@
           <a:p>
             <a:fld id="{318E1502-E61F-4BB6-8EE4-8357EE119714}" type="datetimeFigureOut">
               <a:rPr lang="en-US" smtClean="0"/>
-              <a:t>23/03/2017</a:t>
+              <a:t>3/30/2017</a:t>
             </a:fld>
             <a:endParaRPr lang="en-US"/>
           </a:p>
@@ -2569,7 +2569,7 @@
           <a:p>
             <a:fld id="{318E1502-E61F-4BB6-8EE4-8357EE119714}" type="datetimeFigureOut">
               <a:rPr lang="en-US" smtClean="0"/>
-              <a:t>23/03/2017</a:t>
+              <a:t>3/30/2017</a:t>
             </a:fld>
             <a:endParaRPr lang="en-US"/>
           </a:p>
@@ -4004,7 +4004,12 @@
             <p:ph type="body" idx="1"/>
           </p:nvPr>
         </p:nvSpPr>
-        <p:spPr/>
+        <p:spPr>
+          <a:xfrm>
+            <a:off x="839788" y="1135475"/>
+            <a:ext cx="5157787" cy="823912"/>
+          </a:xfrm>
+        </p:spPr>
         <p:txBody>
           <a:bodyPr/>
           <a:lstStyle/>
@@ -4158,7 +4163,7 @@
         </p:nvSpPr>
         <p:spPr>
           <a:xfrm>
-            <a:off x="641445" y="2620369"/>
+            <a:off x="641445" y="2074681"/>
             <a:ext cx="4285397" cy="1665028"/>
           </a:xfrm>
           <a:prstGeom prst="roundRect">
@@ -4233,7 +4238,7 @@
         </p:nvSpPr>
         <p:spPr>
           <a:xfrm>
-            <a:off x="641444" y="4535508"/>
+            <a:off x="641444" y="3989820"/>
             <a:ext cx="4285397" cy="2322491"/>
           </a:xfrm>
           <a:prstGeom prst="roundRect">

</xml_diff>

<commit_message>
wip: save form values
</commit_message>
<xml_diff>
--- a/app-pallet-rack-costing.pptx
+++ b/app-pallet-rack-costing.pptx
@@ -111,7 +111,7 @@
   </p:defaultTextStyle>
   <p:extLst>
     <p:ext uri="{EFAFB233-063F-42B5-8137-9DF3F51BA10A}">
-      <p15:sldGuideLst xmlns:p15="http://schemas.microsoft.com/office/powerpoint/2012/main"/>
+      <p15:sldGuideLst xmlns:p15="http://schemas.microsoft.com/office/powerpoint/2012/main" xmlns=""/>
     </p:ext>
   </p:extLst>
 </p:presentation>
@@ -4163,7 +4163,7 @@
         </p:nvSpPr>
         <p:spPr>
           <a:xfrm>
-            <a:off x="641445" y="2074681"/>
+            <a:off x="641444" y="2074681"/>
             <a:ext cx="4285397" cy="1665028"/>
           </a:xfrm>
           <a:prstGeom prst="roundRect">
@@ -4375,6 +4375,50 @@
               <a:t>]</a:t>
             </a:r>
             <a:endParaRPr lang="en-US" dirty="0"/>
+          </a:p>
+        </p:txBody>
+      </p:sp>
+      <p:sp>
+        <p:nvSpPr>
+          <p:cNvPr id="12" name="Rounded Rectangle 11"/>
+          <p:cNvSpPr/>
+          <p:nvPr/>
+        </p:nvSpPr>
+        <p:spPr>
+          <a:xfrm>
+            <a:off x="5889422" y="5503887"/>
+            <a:ext cx="1814052" cy="501446"/>
+          </a:xfrm>
+          <a:prstGeom prst="roundRect">
+            <a:avLst/>
+          </a:prstGeom>
+        </p:spPr>
+        <p:style>
+          <a:lnRef idx="2">
+            <a:schemeClr val="accent1">
+              <a:shade val="50000"/>
+            </a:schemeClr>
+          </a:lnRef>
+          <a:fillRef idx="1">
+            <a:schemeClr val="accent1"/>
+          </a:fillRef>
+          <a:effectRef idx="0">
+            <a:schemeClr val="accent1"/>
+          </a:effectRef>
+          <a:fontRef idx="minor">
+            <a:schemeClr val="lt1"/>
+          </a:fontRef>
+        </p:style>
+        <p:txBody>
+          <a:bodyPr rtlCol="0" anchor="ctr"/>
+          <a:lstStyle/>
+          <a:p>
+            <a:pPr algn="ctr"/>
+            <a:r>
+              <a:rPr lang="en-US" b="1" dirty="0" smtClean="0"/>
+              <a:t>Cancel</a:t>
+            </a:r>
+            <a:endParaRPr lang="en-US" b="1" dirty="0"/>
           </a:p>
         </p:txBody>
       </p:sp>
@@ -4572,7 +4616,7 @@
     </a:clrScheme>
     <a:fontScheme name="Office">
       <a:majorFont>
-        <a:latin typeface="Calibri Light" panose="020F0302020204030204"/>
+        <a:latin typeface="Calibri Light"/>
         <a:ea typeface=""/>
         <a:cs typeface=""/>
         <a:font script="Jpan" typeface="游ゴシック Light"/>
@@ -4607,7 +4651,7 @@
         <a:font script="Geor" typeface="Sylfaen"/>
       </a:majorFont>
       <a:minorFont>
-        <a:latin typeface="Calibri" panose="020F0502020204030204"/>
+        <a:latin typeface="Calibri"/>
         <a:ea typeface=""/>
         <a:cs typeface=""/>
         <a:font script="Jpan" typeface="游ゴシック"/>
@@ -4784,7 +4828,7 @@
   <a:extraClrSchemeLst/>
   <a:extLst>
     <a:ext uri="{05A4C25C-085E-4340-85A3-A5531E510DB2}">
-      <thm15:themeFamily xmlns:thm15="http://schemas.microsoft.com/office/thememl/2012/main" name="Office Theme" id="{62F939B6-93AF-4DB8-9C6B-D6C7DFDC589F}" vid="{4A3C46E8-61CC-4603-A589-7422A47A8E4A}"/>
+      <thm15:themeFamily xmlns:thm15="http://schemas.microsoft.com/office/thememl/2012/main" xmlns="" name="Office Theme" id="{62F939B6-93AF-4DB8-9C6B-D6C7DFDC589F}" vid="{4A3C46E8-61CC-4603-A589-7422A47A8E4A}"/>
     </a:ext>
   </a:extLst>
 </a:theme>

</xml_diff>